<commit_message>
Updated FWHM low limit
</commit_message>
<xml_diff>
--- a/figures/newPlots.pptx
+++ b/figures/newPlots.pptx
@@ -289,7 +289,7 @@
             <a:fld id="{1D8BD707-D9CF-40AE-B4C6-C98DA3205C09}" type="datetimeFigureOut">
               <a:rPr lang="en-US" smtClean="0"/>
               <a:pPr/>
-              <a:t>9/22/2017</a:t>
+              <a:t>10/9/2017</a:t>
             </a:fld>
             <a:endParaRPr lang="en-US"/>
           </a:p>
@@ -456,7 +456,7 @@
             <a:fld id="{1D8BD707-D9CF-40AE-B4C6-C98DA3205C09}" type="datetimeFigureOut">
               <a:rPr lang="en-US" smtClean="0"/>
               <a:pPr/>
-              <a:t>9/22/2017</a:t>
+              <a:t>10/9/2017</a:t>
             </a:fld>
             <a:endParaRPr lang="en-US"/>
           </a:p>
@@ -633,7 +633,7 @@
             <a:fld id="{1D8BD707-D9CF-40AE-B4C6-C98DA3205C09}" type="datetimeFigureOut">
               <a:rPr lang="en-US" smtClean="0"/>
               <a:pPr/>
-              <a:t>9/22/2017</a:t>
+              <a:t>10/9/2017</a:t>
             </a:fld>
             <a:endParaRPr lang="en-US"/>
           </a:p>
@@ -800,7 +800,7 @@
             <a:fld id="{1D8BD707-D9CF-40AE-B4C6-C98DA3205C09}" type="datetimeFigureOut">
               <a:rPr lang="en-US" smtClean="0"/>
               <a:pPr/>
-              <a:t>9/22/2017</a:t>
+              <a:t>10/9/2017</a:t>
             </a:fld>
             <a:endParaRPr lang="en-US"/>
           </a:p>
@@ -1043,7 +1043,7 @@
             <a:fld id="{1D8BD707-D9CF-40AE-B4C6-C98DA3205C09}" type="datetimeFigureOut">
               <a:rPr lang="en-US" smtClean="0"/>
               <a:pPr/>
-              <a:t>9/22/2017</a:t>
+              <a:t>10/9/2017</a:t>
             </a:fld>
             <a:endParaRPr lang="en-US"/>
           </a:p>
@@ -1328,7 +1328,7 @@
             <a:fld id="{1D8BD707-D9CF-40AE-B4C6-C98DA3205C09}" type="datetimeFigureOut">
               <a:rPr lang="en-US" smtClean="0"/>
               <a:pPr/>
-              <a:t>9/22/2017</a:t>
+              <a:t>10/9/2017</a:t>
             </a:fld>
             <a:endParaRPr lang="en-US"/>
           </a:p>
@@ -1747,7 +1747,7 @@
             <a:fld id="{1D8BD707-D9CF-40AE-B4C6-C98DA3205C09}" type="datetimeFigureOut">
               <a:rPr lang="en-US" smtClean="0"/>
               <a:pPr/>
-              <a:t>9/22/2017</a:t>
+              <a:t>10/9/2017</a:t>
             </a:fld>
             <a:endParaRPr lang="en-US"/>
           </a:p>
@@ -1862,7 +1862,7 @@
             <a:fld id="{1D8BD707-D9CF-40AE-B4C6-C98DA3205C09}" type="datetimeFigureOut">
               <a:rPr lang="en-US" smtClean="0"/>
               <a:pPr/>
-              <a:t>9/22/2017</a:t>
+              <a:t>10/9/2017</a:t>
             </a:fld>
             <a:endParaRPr lang="en-US"/>
           </a:p>
@@ -1954,7 +1954,7 @@
             <a:fld id="{1D8BD707-D9CF-40AE-B4C6-C98DA3205C09}" type="datetimeFigureOut">
               <a:rPr lang="en-US" smtClean="0"/>
               <a:pPr/>
-              <a:t>9/22/2017</a:t>
+              <a:t>10/9/2017</a:t>
             </a:fld>
             <a:endParaRPr lang="en-US"/>
           </a:p>
@@ -2228,7 +2228,7 @@
             <a:fld id="{1D8BD707-D9CF-40AE-B4C6-C98DA3205C09}" type="datetimeFigureOut">
               <a:rPr lang="en-US" smtClean="0"/>
               <a:pPr/>
-              <a:t>9/22/2017</a:t>
+              <a:t>10/9/2017</a:t>
             </a:fld>
             <a:endParaRPr lang="en-US"/>
           </a:p>
@@ -2478,7 +2478,7 @@
             <a:fld id="{1D8BD707-D9CF-40AE-B4C6-C98DA3205C09}" type="datetimeFigureOut">
               <a:rPr lang="en-US" smtClean="0"/>
               <a:pPr/>
-              <a:t>9/22/2017</a:t>
+              <a:t>10/9/2017</a:t>
             </a:fld>
             <a:endParaRPr lang="en-US"/>
           </a:p>
@@ -2688,7 +2688,7 @@
             <a:fld id="{1D8BD707-D9CF-40AE-B4C6-C98DA3205C09}" type="datetimeFigureOut">
               <a:rPr lang="en-US" smtClean="0"/>
               <a:pPr/>
-              <a:t>9/22/2017</a:t>
+              <a:t>10/9/2017</a:t>
             </a:fld>
             <a:endParaRPr lang="en-US"/>
           </a:p>
@@ -3061,7 +3061,7 @@
       </p:grpSpPr>
       <p:pic>
         <p:nvPicPr>
-          <p:cNvPr id="1026" name="Picture 2" descr="C:\Research_FangRen\Python codes\MGI_paper_on_MG - CoVZr\figures\FWHM_interpolated_CoFeZr.png"/>
+          <p:cNvPr id="4" name="Picture 5" descr="C:\Research_FangRen\Python codes\MGI_paper_on_MG - CoVZr\figures\FigureS4b.png"/>
           <p:cNvPicPr>
             <a:picLocks noChangeAspect="1" noChangeArrowheads="1"/>
           </p:cNvPicPr>
@@ -3082,7 +3082,48 @@
         </p:blipFill>
         <p:spPr bwMode="auto">
           <a:xfrm>
-            <a:off x="2209801" y="1219200"/>
+            <a:off x="6781800" y="1143000"/>
+            <a:ext cx="2438400" cy="1828800"/>
+          </a:xfrm>
+          <a:prstGeom prst="rect">
+            <a:avLst/>
+          </a:prstGeom>
+          <a:noFill/>
+          <a:extLst>
+            <a:ext uri="{909E8E84-426E-40DD-AFC4-6F175D3DCCD1}">
+              <a14:hiddenFill xmlns:a14="http://schemas.microsoft.com/office/drawing/2010/main">
+                <a:solidFill>
+                  <a:srgbClr val="FFFFFF"/>
+                </a:solidFill>
+              </a14:hiddenFill>
+            </a:ext>
+          </a:extLst>
+        </p:spPr>
+      </p:pic>
+      <p:pic>
+        <p:nvPicPr>
+          <p:cNvPr id="3" name="Picture 4" descr="C:\Research_FangRen\Python codes\MGI_paper_on_MG - CoVZr\figures\FWHM_interpolated_CoTiZr.png"/>
+          <p:cNvPicPr>
+            <a:picLocks noChangeAspect="1" noChangeArrowheads="1"/>
+          </p:cNvPicPr>
+          <p:nvPr/>
+        </p:nvPicPr>
+        <p:blipFill>
+          <a:blip r:embed="rId3" cstate="print">
+            <a:extLst>
+              <a:ext uri="{28A0092B-C50C-407E-A947-70E740481C1C}">
+                <a14:useLocalDpi xmlns:a14="http://schemas.microsoft.com/office/drawing/2010/main" val="0"/>
+              </a:ext>
+            </a:extLst>
+          </a:blip>
+          <a:srcRect/>
+          <a:stretch>
+            <a:fillRect/>
+          </a:stretch>
+        </p:blipFill>
+        <p:spPr bwMode="auto">
+          <a:xfrm>
+            <a:off x="4495800" y="1143000"/>
             <a:ext cx="2438400" cy="1828800"/>
           </a:xfrm>
           <a:prstGeom prst="rect">
@@ -3109,7 +3150,7 @@
           <p:nvPr/>
         </p:nvPicPr>
         <p:blipFill>
-          <a:blip r:embed="rId3" cstate="print">
+          <a:blip r:embed="rId4" cstate="print">
             <a:extLst>
               <a:ext uri="{28A0092B-C50C-407E-A947-70E740481C1C}">
                 <a14:useLocalDpi xmlns:a14="http://schemas.microsoft.com/office/drawing/2010/main" val="0"/>
@@ -3150,7 +3191,7 @@
           <p:nvPr/>
         </p:nvPicPr>
         <p:blipFill>
-          <a:blip r:embed="rId4" cstate="print">
+          <a:blip r:embed="rId5" cstate="print">
             <a:extLst>
               <a:ext uri="{28A0092B-C50C-407E-A947-70E740481C1C}">
                 <a14:useLocalDpi xmlns:a14="http://schemas.microsoft.com/office/drawing/2010/main" val="0"/>
@@ -3165,47 +3206,6 @@
         <p:spPr bwMode="auto">
           <a:xfrm>
             <a:off x="4572001" y="3429000"/>
-            <a:ext cx="2438400" cy="1828800"/>
-          </a:xfrm>
-          <a:prstGeom prst="rect">
-            <a:avLst/>
-          </a:prstGeom>
-          <a:noFill/>
-          <a:extLst>
-            <a:ext uri="{909E8E84-426E-40DD-AFC4-6F175D3DCCD1}">
-              <a14:hiddenFill xmlns:a14="http://schemas.microsoft.com/office/drawing/2010/main">
-                <a:solidFill>
-                  <a:srgbClr val="FFFFFF"/>
-                </a:solidFill>
-              </a14:hiddenFill>
-            </a:ext>
-          </a:extLst>
-        </p:spPr>
-      </p:pic>
-      <p:pic>
-        <p:nvPicPr>
-          <p:cNvPr id="1030" name="Picture 6" descr="C:\Research_FangRen\Python codes\MGI_paper_on_MG - CoVZr\figures\FigureS4b.png"/>
-          <p:cNvPicPr>
-            <a:picLocks noChangeAspect="1" noChangeArrowheads="1"/>
-          </p:cNvPicPr>
-          <p:nvPr/>
-        </p:nvPicPr>
-        <p:blipFill>
-          <a:blip r:embed="rId5" cstate="print">
-            <a:extLst>
-              <a:ext uri="{28A0092B-C50C-407E-A947-70E740481C1C}">
-                <a14:useLocalDpi xmlns:a14="http://schemas.microsoft.com/office/drawing/2010/main" val="0"/>
-              </a:ext>
-            </a:extLst>
-          </a:blip>
-          <a:srcRect/>
-          <a:stretch>
-            <a:fillRect/>
-          </a:stretch>
-        </p:blipFill>
-        <p:spPr bwMode="auto">
-          <a:xfrm>
-            <a:off x="6705601" y="1219200"/>
             <a:ext cx="2438400" cy="1828800"/>
           </a:xfrm>
           <a:prstGeom prst="rect">
@@ -3266,7 +3266,7 @@
       </p:pic>
       <p:pic>
         <p:nvPicPr>
-          <p:cNvPr id="11" name="Picture 3" descr="C:\Research_FangRen\Python codes\MGI_paper_on_MG - CoVZr\figures\FWHM_interpolated_CoTiZr.png"/>
+          <p:cNvPr id="1033" name="Picture 9" descr="C:\Research_FangRen\Python codes\MGI_paper_on_MG - CoVZr\figures\Figure3b_GFA_CoVZr.png"/>
           <p:cNvPicPr>
             <a:picLocks noChangeAspect="1" noChangeArrowheads="1"/>
           </p:cNvPicPr>
@@ -3287,8 +3287,8 @@
         </p:blipFill>
         <p:spPr bwMode="auto">
           <a:xfrm>
-            <a:off x="4572001" y="1219200"/>
-            <a:ext cx="2438400" cy="1828800"/>
+            <a:off x="-76200" y="3429000"/>
+            <a:ext cx="2438401" cy="1828800"/>
           </a:xfrm>
           <a:prstGeom prst="rect">
             <a:avLst/>
@@ -3307,7 +3307,7 @@
       </p:pic>
       <p:pic>
         <p:nvPicPr>
-          <p:cNvPr id="1032" name="Picture 8" descr="C:\Research_FangRen\Python codes\MGI_paper_on_MG - CoVZr\figures\FigureS3c_FWHM_interpolated_CoVZr.png"/>
+          <p:cNvPr id="2" name="Picture 2" descr="C:\Research_FangRen\Python codes\MGI_paper_on_MG - CoVZr\figures\FWHM_interpolated_CoFeZr.png"/>
           <p:cNvPicPr>
             <a:picLocks noChangeAspect="1" noChangeArrowheads="1"/>
           </p:cNvPicPr>
@@ -3328,8 +3328,8 @@
         </p:blipFill>
         <p:spPr bwMode="auto">
           <a:xfrm>
-            <a:off x="-76200" y="1219200"/>
-            <a:ext cx="2438401" cy="1828800"/>
+            <a:off x="2209800" y="1182445"/>
+            <a:ext cx="2438400" cy="1828800"/>
           </a:xfrm>
           <a:prstGeom prst="rect">
             <a:avLst/>
@@ -3348,7 +3348,7 @@
       </p:pic>
       <p:pic>
         <p:nvPicPr>
-          <p:cNvPr id="1033" name="Picture 9" descr="C:\Research_FangRen\Python codes\MGI_paper_on_MG - CoVZr\figures\Figure3b_GFA_CoVZr.png"/>
+          <p:cNvPr id="1027" name="Picture 3" descr="C:\Research_FangRen\Python codes\MGI_paper_on_MG - CoVZr\figures\FigureS3c_FWHM_interpolated_CoVZr.png"/>
           <p:cNvPicPr>
             <a:picLocks noChangeAspect="1" noChangeArrowheads="1"/>
           </p:cNvPicPr>
@@ -3369,8 +3369,8 @@
         </p:blipFill>
         <p:spPr bwMode="auto">
           <a:xfrm>
-            <a:off x="-76200" y="3429000"/>
-            <a:ext cx="2438401" cy="1828800"/>
+            <a:off x="-76199" y="1219200"/>
+            <a:ext cx="2438400" cy="1828800"/>
           </a:xfrm>
           <a:prstGeom prst="rect">
             <a:avLst/>

</xml_diff>